<commit_message>
Add next steps slide
</commit_message>
<xml_diff>
--- a/Bellabeat case study PPT.pptx
+++ b/Bellabeat case study PPT.pptx
@@ -134,7 +134,7 @@
   <pc:docChgLst>
     <pc:chgData name="Joseph Reina" userId="8750fbaa35ef2952" providerId="LiveId" clId="{88D32ADC-C49D-4F8D-8F8D-ECEC16AF0C72}"/>
     <pc:docChg chg="undo custSel addSld modSld">
-      <pc:chgData name="Joseph Reina" userId="8750fbaa35ef2952" providerId="LiveId" clId="{88D32ADC-C49D-4F8D-8F8D-ECEC16AF0C72}" dt="2026-01-03T01:13:27.795" v="729" actId="680"/>
+      <pc:chgData name="Joseph Reina" userId="8750fbaa35ef2952" providerId="LiveId" clId="{88D32ADC-C49D-4F8D-8F8D-ECEC16AF0C72}" dt="2026-01-03T17:07:26.541" v="1230" actId="26606"/>
       <pc:docMkLst>
         <pc:docMk/>
       </pc:docMkLst>
@@ -265,6 +265,85 @@
           </ac:graphicFrameMkLst>
         </pc:graphicFrameChg>
       </pc:sldChg>
+      <pc:sldChg chg="addSp delSp modSp mod">
+        <pc:chgData name="Joseph Reina" userId="8750fbaa35ef2952" providerId="LiveId" clId="{88D32ADC-C49D-4F8D-8F8D-ECEC16AF0C72}" dt="2026-01-03T17:07:26.541" v="1230" actId="26606"/>
+        <pc:sldMkLst>
+          <pc:docMk/>
+          <pc:sldMk cId="1362752947" sldId="258"/>
+        </pc:sldMkLst>
+        <pc:spChg chg="mod">
+          <ac:chgData name="Joseph Reina" userId="8750fbaa35ef2952" providerId="LiveId" clId="{88D32ADC-C49D-4F8D-8F8D-ECEC16AF0C72}" dt="2026-01-03T17:07:26.541" v="1230" actId="26606"/>
+          <ac:spMkLst>
+            <pc:docMk/>
+            <pc:sldMk cId="1362752947" sldId="258"/>
+            <ac:spMk id="3" creationId="{B194C3A4-951D-24CA-43B4-32F14F23CE9A}"/>
+          </ac:spMkLst>
+        </pc:spChg>
+        <pc:spChg chg="del">
+          <ac:chgData name="Joseph Reina" userId="8750fbaa35ef2952" providerId="LiveId" clId="{88D32ADC-C49D-4F8D-8F8D-ECEC16AF0C72}" dt="2026-01-03T17:07:26.541" v="1230" actId="26606"/>
+          <ac:spMkLst>
+            <pc:docMk/>
+            <pc:sldMk cId="1362752947" sldId="258"/>
+            <ac:spMk id="41" creationId="{C2554CA6-288E-4202-BC52-2E5A8F0C0AED}"/>
+          </ac:spMkLst>
+        </pc:spChg>
+        <pc:spChg chg="del">
+          <ac:chgData name="Joseph Reina" userId="8750fbaa35ef2952" providerId="LiveId" clId="{88D32ADC-C49D-4F8D-8F8D-ECEC16AF0C72}" dt="2026-01-03T17:07:26.541" v="1230" actId="26606"/>
+          <ac:spMkLst>
+            <pc:docMk/>
+            <pc:sldMk cId="1362752947" sldId="258"/>
+            <ac:spMk id="43" creationId="{B10BB131-AC8E-4A8E-A5D1-36260F720C3B}"/>
+          </ac:spMkLst>
+        </pc:spChg>
+        <pc:spChg chg="del">
+          <ac:chgData name="Joseph Reina" userId="8750fbaa35ef2952" providerId="LiveId" clId="{88D32ADC-C49D-4F8D-8F8D-ECEC16AF0C72}" dt="2026-01-03T17:07:26.541" v="1230" actId="26606"/>
+          <ac:spMkLst>
+            <pc:docMk/>
+            <pc:sldMk cId="1362752947" sldId="258"/>
+            <ac:spMk id="45" creationId="{5B7778FC-632E-4DCA-A7CB-0D7731CCF970}"/>
+          </ac:spMkLst>
+        </pc:spChg>
+        <pc:spChg chg="del">
+          <ac:chgData name="Joseph Reina" userId="8750fbaa35ef2952" providerId="LiveId" clId="{88D32ADC-C49D-4F8D-8F8D-ECEC16AF0C72}" dt="2026-01-03T17:07:26.541" v="1230" actId="26606"/>
+          <ac:spMkLst>
+            <pc:docMk/>
+            <pc:sldMk cId="1362752947" sldId="258"/>
+            <ac:spMk id="47" creationId="{FA23A907-97FB-4A8F-880A-DD77401C4296}"/>
+          </ac:spMkLst>
+        </pc:spChg>
+        <pc:spChg chg="add">
+          <ac:chgData name="Joseph Reina" userId="8750fbaa35ef2952" providerId="LiveId" clId="{88D32ADC-C49D-4F8D-8F8D-ECEC16AF0C72}" dt="2026-01-03T17:07:26.541" v="1230" actId="26606"/>
+          <ac:spMkLst>
+            <pc:docMk/>
+            <pc:sldMk cId="1362752947" sldId="258"/>
+            <ac:spMk id="52" creationId="{C2554CA6-288E-4202-BC52-2E5A8F0C0AED}"/>
+          </ac:spMkLst>
+        </pc:spChg>
+        <pc:spChg chg="add">
+          <ac:chgData name="Joseph Reina" userId="8750fbaa35ef2952" providerId="LiveId" clId="{88D32ADC-C49D-4F8D-8F8D-ECEC16AF0C72}" dt="2026-01-03T17:07:26.541" v="1230" actId="26606"/>
+          <ac:spMkLst>
+            <pc:docMk/>
+            <pc:sldMk cId="1362752947" sldId="258"/>
+            <ac:spMk id="54" creationId="{B10BB131-AC8E-4A8E-A5D1-36260F720C3B}"/>
+          </ac:spMkLst>
+        </pc:spChg>
+        <pc:spChg chg="add">
+          <ac:chgData name="Joseph Reina" userId="8750fbaa35ef2952" providerId="LiveId" clId="{88D32ADC-C49D-4F8D-8F8D-ECEC16AF0C72}" dt="2026-01-03T17:07:26.541" v="1230" actId="26606"/>
+          <ac:spMkLst>
+            <pc:docMk/>
+            <pc:sldMk cId="1362752947" sldId="258"/>
+            <ac:spMk id="56" creationId="{5B7778FC-632E-4DCA-A7CB-0D7731CCF970}"/>
+          </ac:spMkLst>
+        </pc:spChg>
+        <pc:spChg chg="add">
+          <ac:chgData name="Joseph Reina" userId="8750fbaa35ef2952" providerId="LiveId" clId="{88D32ADC-C49D-4F8D-8F8D-ECEC16AF0C72}" dt="2026-01-03T17:07:26.541" v="1230" actId="26606"/>
+          <ac:spMkLst>
+            <pc:docMk/>
+            <pc:sldMk cId="1362752947" sldId="258"/>
+            <ac:spMk id="58" creationId="{FA23A907-97FB-4A8F-880A-DD77401C4296}"/>
+          </ac:spMkLst>
+        </pc:spChg>
+      </pc:sldChg>
       <pc:sldChg chg="addSp delSp modSp mod setBg">
         <pc:chgData name="Joseph Reina" userId="8750fbaa35ef2952" providerId="LiveId" clId="{88D32ADC-C49D-4F8D-8F8D-ECEC16AF0C72}" dt="2026-01-03T01:01:20.626" v="315" actId="26606"/>
         <pc:sldMkLst>
@@ -376,12 +455,60 @@
           </ac:cxnSpMkLst>
         </pc:cxnChg>
       </pc:sldChg>
-      <pc:sldChg chg="new">
-        <pc:chgData name="Joseph Reina" userId="8750fbaa35ef2952" providerId="LiveId" clId="{88D32ADC-C49D-4F8D-8F8D-ECEC16AF0C72}" dt="2026-01-03T01:13:27.795" v="729" actId="680"/>
+      <pc:sldChg chg="addSp modSp new mod setBg">
+        <pc:chgData name="Joseph Reina" userId="8750fbaa35ef2952" providerId="LiveId" clId="{88D32ADC-C49D-4F8D-8F8D-ECEC16AF0C72}" dt="2026-01-03T17:06:09.856" v="1143" actId="20577"/>
         <pc:sldMkLst>
           <pc:docMk/>
           <pc:sldMk cId="557253845" sldId="262"/>
         </pc:sldMkLst>
+        <pc:spChg chg="mod">
+          <ac:chgData name="Joseph Reina" userId="8750fbaa35ef2952" providerId="LiveId" clId="{88D32ADC-C49D-4F8D-8F8D-ECEC16AF0C72}" dt="2026-01-03T17:05:18.642" v="1130" actId="26606"/>
+          <ac:spMkLst>
+            <pc:docMk/>
+            <pc:sldMk cId="557253845" sldId="262"/>
+            <ac:spMk id="2" creationId="{2D1CB936-A4D2-286D-C56C-221BDF649D2D}"/>
+          </ac:spMkLst>
+        </pc:spChg>
+        <pc:spChg chg="mod">
+          <ac:chgData name="Joseph Reina" userId="8750fbaa35ef2952" providerId="LiveId" clId="{88D32ADC-C49D-4F8D-8F8D-ECEC16AF0C72}" dt="2026-01-03T17:06:09.856" v="1143" actId="20577"/>
+          <ac:spMkLst>
+            <pc:docMk/>
+            <pc:sldMk cId="557253845" sldId="262"/>
+            <ac:spMk id="3" creationId="{87D207AD-D965-B78B-8262-6E2A26D49F53}"/>
+          </ac:spMkLst>
+        </pc:spChg>
+        <pc:spChg chg="add">
+          <ac:chgData name="Joseph Reina" userId="8750fbaa35ef2952" providerId="LiveId" clId="{88D32ADC-C49D-4F8D-8F8D-ECEC16AF0C72}" dt="2026-01-03T17:05:18.642" v="1130" actId="26606"/>
+          <ac:spMkLst>
+            <pc:docMk/>
+            <pc:sldMk cId="557253845" sldId="262"/>
+            <ac:spMk id="8" creationId="{C2554CA6-288E-4202-BC52-2E5A8F0C0AED}"/>
+          </ac:spMkLst>
+        </pc:spChg>
+        <pc:spChg chg="add">
+          <ac:chgData name="Joseph Reina" userId="8750fbaa35ef2952" providerId="LiveId" clId="{88D32ADC-C49D-4F8D-8F8D-ECEC16AF0C72}" dt="2026-01-03T17:05:18.642" v="1130" actId="26606"/>
+          <ac:spMkLst>
+            <pc:docMk/>
+            <pc:sldMk cId="557253845" sldId="262"/>
+            <ac:spMk id="10" creationId="{B10BB131-AC8E-4A8E-A5D1-36260F720C3B}"/>
+          </ac:spMkLst>
+        </pc:spChg>
+        <pc:spChg chg="add">
+          <ac:chgData name="Joseph Reina" userId="8750fbaa35ef2952" providerId="LiveId" clId="{88D32ADC-C49D-4F8D-8F8D-ECEC16AF0C72}" dt="2026-01-03T17:05:18.642" v="1130" actId="26606"/>
+          <ac:spMkLst>
+            <pc:docMk/>
+            <pc:sldMk cId="557253845" sldId="262"/>
+            <ac:spMk id="12" creationId="{5B7778FC-632E-4DCA-A7CB-0D7731CCF970}"/>
+          </ac:spMkLst>
+        </pc:spChg>
+        <pc:spChg chg="add">
+          <ac:chgData name="Joseph Reina" userId="8750fbaa35ef2952" providerId="LiveId" clId="{88D32ADC-C49D-4F8D-8F8D-ECEC16AF0C72}" dt="2026-01-03T17:05:18.642" v="1130" actId="26606"/>
+          <ac:spMkLst>
+            <pc:docMk/>
+            <pc:sldMk cId="557253845" sldId="262"/>
+            <ac:spMk id="14" creationId="{FA23A907-97FB-4A8F-880A-DD77401C4296}"/>
+          </ac:spMkLst>
+        </pc:spChg>
       </pc:sldChg>
     </pc:docChg>
   </pc:docChgLst>
@@ -3296,7 +3423,7 @@
           <a:p>
             <a:fld id="{456805F3-1038-40AA-81C8-4EAF7DE49608}" type="datetimeFigureOut">
               <a:rPr lang="es-CO" smtClean="0"/>
-              <a:t>2/01/2026</a:t>
+              <a:t>3/01/2026</a:t>
             </a:fld>
             <a:endParaRPr lang="es-CO"/>
           </a:p>
@@ -3779,7 +3906,7 @@
           <a:p>
             <a:fld id="{F900CFC6-CE1A-4DC5-B2FB-0B03DF995FB8}" type="datetimeFigureOut">
               <a:rPr lang="es-CO" smtClean="0"/>
-              <a:t>2/01/2026</a:t>
+              <a:t>3/01/2026</a:t>
             </a:fld>
             <a:endParaRPr lang="es-CO"/>
           </a:p>
@@ -3949,7 +4076,7 @@
           <a:p>
             <a:fld id="{F900CFC6-CE1A-4DC5-B2FB-0B03DF995FB8}" type="datetimeFigureOut">
               <a:rPr lang="es-CO" smtClean="0"/>
-              <a:t>2/01/2026</a:t>
+              <a:t>3/01/2026</a:t>
             </a:fld>
             <a:endParaRPr lang="es-CO"/>
           </a:p>
@@ -4129,7 +4256,7 @@
           <a:p>
             <a:fld id="{F900CFC6-CE1A-4DC5-B2FB-0B03DF995FB8}" type="datetimeFigureOut">
               <a:rPr lang="es-CO" smtClean="0"/>
-              <a:t>2/01/2026</a:t>
+              <a:t>3/01/2026</a:t>
             </a:fld>
             <a:endParaRPr lang="es-CO"/>
           </a:p>
@@ -4299,7 +4426,7 @@
           <a:p>
             <a:fld id="{F900CFC6-CE1A-4DC5-B2FB-0B03DF995FB8}" type="datetimeFigureOut">
               <a:rPr lang="es-CO" smtClean="0"/>
-              <a:t>2/01/2026</a:t>
+              <a:t>3/01/2026</a:t>
             </a:fld>
             <a:endParaRPr lang="es-CO"/>
           </a:p>
@@ -4545,7 +4672,7 @@
           <a:p>
             <a:fld id="{F900CFC6-CE1A-4DC5-B2FB-0B03DF995FB8}" type="datetimeFigureOut">
               <a:rPr lang="es-CO" smtClean="0"/>
-              <a:t>2/01/2026</a:t>
+              <a:t>3/01/2026</a:t>
             </a:fld>
             <a:endParaRPr lang="es-CO"/>
           </a:p>
@@ -4777,7 +4904,7 @@
           <a:p>
             <a:fld id="{F900CFC6-CE1A-4DC5-B2FB-0B03DF995FB8}" type="datetimeFigureOut">
               <a:rPr lang="es-CO" smtClean="0"/>
-              <a:t>2/01/2026</a:t>
+              <a:t>3/01/2026</a:t>
             </a:fld>
             <a:endParaRPr lang="es-CO"/>
           </a:p>
@@ -5144,7 +5271,7 @@
           <a:p>
             <a:fld id="{F900CFC6-CE1A-4DC5-B2FB-0B03DF995FB8}" type="datetimeFigureOut">
               <a:rPr lang="es-CO" smtClean="0"/>
-              <a:t>2/01/2026</a:t>
+              <a:t>3/01/2026</a:t>
             </a:fld>
             <a:endParaRPr lang="es-CO"/>
           </a:p>
@@ -5262,7 +5389,7 @@
           <a:p>
             <a:fld id="{F900CFC6-CE1A-4DC5-B2FB-0B03DF995FB8}" type="datetimeFigureOut">
               <a:rPr lang="es-CO" smtClean="0"/>
-              <a:t>2/01/2026</a:t>
+              <a:t>3/01/2026</a:t>
             </a:fld>
             <a:endParaRPr lang="es-CO"/>
           </a:p>
@@ -5357,7 +5484,7 @@
           <a:p>
             <a:fld id="{F900CFC6-CE1A-4DC5-B2FB-0B03DF995FB8}" type="datetimeFigureOut">
               <a:rPr lang="es-CO" smtClean="0"/>
-              <a:t>2/01/2026</a:t>
+              <a:t>3/01/2026</a:t>
             </a:fld>
             <a:endParaRPr lang="es-CO"/>
           </a:p>
@@ -5634,7 +5761,7 @@
           <a:p>
             <a:fld id="{F900CFC6-CE1A-4DC5-B2FB-0B03DF995FB8}" type="datetimeFigureOut">
               <a:rPr lang="es-CO" smtClean="0"/>
-              <a:t>2/01/2026</a:t>
+              <a:t>3/01/2026</a:t>
             </a:fld>
             <a:endParaRPr lang="es-CO"/>
           </a:p>
@@ -5891,7 +6018,7 @@
           <a:p>
             <a:fld id="{F900CFC6-CE1A-4DC5-B2FB-0B03DF995FB8}" type="datetimeFigureOut">
               <a:rPr lang="es-CO" smtClean="0"/>
-              <a:t>2/01/2026</a:t>
+              <a:t>3/01/2026</a:t>
             </a:fld>
             <a:endParaRPr lang="es-CO"/>
           </a:p>
@@ -6104,7 +6231,7 @@
           <a:p>
             <a:fld id="{F900CFC6-CE1A-4DC5-B2FB-0B03DF995FB8}" type="datetimeFigureOut">
               <a:rPr lang="es-CO" smtClean="0"/>
-              <a:t>2/01/2026</a:t>
+              <a:t>3/01/2026</a:t>
             </a:fld>
             <a:endParaRPr lang="es-CO"/>
           </a:p>
@@ -7552,7 +7679,7 @@
       </p:grpSpPr>
       <p:sp useBgFill="1">
         <p:nvSpPr>
-          <p:cNvPr id="41" name="Rectangle 40">
+          <p:cNvPr id="52" name="Rectangle 51">
             <a:extLst>
               <a:ext uri="{FF2B5EF4-FFF2-40B4-BE49-F238E27FC236}">
                 <a16:creationId xmlns:a16="http://schemas.microsoft.com/office/drawing/2014/main" id="{C2554CA6-288E-4202-BC52-2E5A8F0C0AED}"/>
@@ -7612,7 +7739,7 @@
       </p:sp>
       <p:sp>
         <p:nvSpPr>
-          <p:cNvPr id="43" name="Oval 42">
+          <p:cNvPr id="54" name="Oval 53">
             <a:extLst>
               <a:ext uri="{FF2B5EF4-FFF2-40B4-BE49-F238E27FC236}">
                 <a16:creationId xmlns:a16="http://schemas.microsoft.com/office/drawing/2014/main" id="{B10BB131-AC8E-4A8E-A5D1-36260F720C3B}"/>
@@ -7727,7 +7854,7 @@
       </p:sp>
       <p:sp>
         <p:nvSpPr>
-          <p:cNvPr id="45" name="Arc 44">
+          <p:cNvPr id="56" name="Arc 55">
             <a:extLst>
               <a:ext uri="{FF2B5EF4-FFF2-40B4-BE49-F238E27FC236}">
                 <a16:creationId xmlns:a16="http://schemas.microsoft.com/office/drawing/2014/main" id="{5B7778FC-632E-4DCA-A7CB-0D7731CCF970}"/>
@@ -7821,7 +7948,7 @@
       </p:sp>
       <p:sp>
         <p:nvSpPr>
-          <p:cNvPr id="47" name="Oval 46">
+          <p:cNvPr id="58" name="Oval 57">
             <a:extLst>
               <a:ext uri="{FF2B5EF4-FFF2-40B4-BE49-F238E27FC236}">
                 <a16:creationId xmlns:a16="http://schemas.microsoft.com/office/drawing/2014/main" id="{FA23A907-97FB-4A8F-880A-DD77401C4296}"/>
@@ -7943,91 +8070,91 @@
               <a:buNone/>
             </a:pPr>
             <a:r>
-              <a:rPr lang="es-CO" sz="2200" dirty="0" err="1"/>
+              <a:rPr lang="es-CO" sz="1800" err="1"/>
               <a:t>For</a:t>
             </a:r>
             <a:r>
-              <a:rPr lang="es-CO" sz="2200" dirty="0"/>
+              <a:rPr lang="es-CO" sz="1800"/>
               <a:t> </a:t>
             </a:r>
             <a:r>
-              <a:rPr lang="es-CO" sz="2200" dirty="0" err="1"/>
+              <a:rPr lang="es-CO" sz="1800" err="1"/>
               <a:t>this</a:t>
             </a:r>
             <a:r>
-              <a:rPr lang="es-CO" sz="2200" dirty="0"/>
+              <a:rPr lang="es-CO" sz="1800"/>
               <a:t> case </a:t>
             </a:r>
             <a:r>
-              <a:rPr lang="es-CO" sz="2200" dirty="0" err="1"/>
+              <a:rPr lang="es-CO" sz="1800" err="1"/>
               <a:t>I´ve</a:t>
             </a:r>
             <a:r>
-              <a:rPr lang="es-CO" sz="2200" dirty="0"/>
+              <a:rPr lang="es-CO" sz="1800"/>
               <a:t> </a:t>
             </a:r>
             <a:r>
-              <a:rPr lang="es-CO" sz="2200" dirty="0" err="1"/>
+              <a:rPr lang="es-CO" sz="1800" err="1"/>
               <a:t>used</a:t>
             </a:r>
             <a:r>
-              <a:rPr lang="es-CO" sz="2200" dirty="0"/>
+              <a:rPr lang="es-CO" sz="1800"/>
               <a:t> </a:t>
             </a:r>
             <a:r>
-              <a:rPr lang="es-CO" sz="2200" b="1" dirty="0" err="1"/>
+              <a:rPr lang="es-CO" sz="1800" b="1" err="1"/>
               <a:t>FitBit</a:t>
             </a:r>
             <a:r>
-              <a:rPr lang="es-CO" sz="2200" b="1" dirty="0"/>
+              <a:rPr lang="es-CO" sz="1800" b="1"/>
               <a:t> Fitness </a:t>
             </a:r>
             <a:r>
-              <a:rPr lang="es-CO" sz="2200" b="1" dirty="0" err="1"/>
+              <a:rPr lang="es-CO" sz="1800" b="1" err="1"/>
               <a:t>Tracker</a:t>
             </a:r>
             <a:r>
-              <a:rPr lang="es-CO" sz="2200" b="1" dirty="0"/>
+              <a:rPr lang="es-CO" sz="1800" b="1"/>
               <a:t> Data </a:t>
             </a:r>
             <a:r>
-              <a:rPr lang="es-CO" sz="2200" dirty="0" err="1"/>
+              <a:rPr lang="es-CO" sz="1800" err="1"/>
               <a:t>from</a:t>
             </a:r>
             <a:r>
-              <a:rPr lang="es-CO" sz="2200" dirty="0"/>
+              <a:rPr lang="es-CO" sz="1800"/>
               <a:t> </a:t>
             </a:r>
             <a:r>
-              <a:rPr lang="es-CO" sz="2200" dirty="0" err="1"/>
+              <a:rPr lang="es-CO" sz="1800" err="1"/>
               <a:t>Kaggle</a:t>
             </a:r>
             <a:r>
-              <a:rPr lang="es-CO" sz="2200" dirty="0"/>
+              <a:rPr lang="es-CO" sz="1800"/>
               <a:t>, </a:t>
             </a:r>
             <a:r>
-              <a:rPr lang="es-CO" sz="2200" dirty="0" err="1"/>
+              <a:rPr lang="es-CO" sz="1800" err="1"/>
               <a:t>with</a:t>
             </a:r>
             <a:r>
-              <a:rPr lang="es-CO" sz="2200" dirty="0"/>
+              <a:rPr lang="es-CO" sz="1800"/>
               <a:t> data </a:t>
             </a:r>
             <a:r>
-              <a:rPr lang="es-CO" sz="2200" dirty="0" err="1"/>
+              <a:rPr lang="es-CO" sz="1800" err="1"/>
               <a:t>from</a:t>
             </a:r>
             <a:r>
-              <a:rPr lang="es-CO" sz="2200" dirty="0"/>
+              <a:rPr lang="es-CO" sz="1800"/>
               <a:t> April-2016 </a:t>
             </a:r>
             <a:r>
-              <a:rPr lang="es-CO" sz="2200" dirty="0" err="1"/>
+              <a:rPr lang="es-CO" sz="1800" err="1"/>
               <a:t>to</a:t>
             </a:r>
             <a:r>
-              <a:rPr lang="es-CO" sz="2200" dirty="0"/>
+              <a:rPr lang="es-CO" sz="1800"/>
               <a:t> May-2016</a:t>
             </a:r>
           </a:p>
@@ -8036,11 +8163,11 @@
               <a:buNone/>
             </a:pPr>
             <a:r>
-              <a:rPr lang="es-CO" sz="2200" dirty="0" err="1"/>
+              <a:rPr lang="es-CO" sz="1800" err="1"/>
               <a:t>Limitations</a:t>
             </a:r>
             <a:r>
-              <a:rPr lang="es-CO" sz="2200" dirty="0"/>
+              <a:rPr lang="es-CO" sz="1800"/>
               <a:t>:</a:t>
             </a:r>
           </a:p>
@@ -8049,181 +8176,181 @@
               <a:buNone/>
             </a:pPr>
             <a:r>
-              <a:rPr lang="es-CO" sz="2200" dirty="0"/>
+              <a:rPr lang="es-CO" sz="1800"/>
               <a:t>-</a:t>
             </a:r>
             <a:r>
-              <a:rPr lang="es-CO" sz="2200" dirty="0" err="1"/>
+              <a:rPr lang="es-CO" sz="1800" err="1"/>
               <a:t>Dataset</a:t>
             </a:r>
             <a:r>
-              <a:rPr lang="es-CO" sz="2200" dirty="0"/>
+              <a:rPr lang="es-CO" sz="1800"/>
               <a:t> </a:t>
             </a:r>
             <a:r>
-              <a:rPr lang="es-CO" sz="2200" dirty="0" err="1"/>
+              <a:rPr lang="es-CO" sz="1800" err="1"/>
               <a:t>does</a:t>
             </a:r>
             <a:r>
-              <a:rPr lang="es-CO" sz="2200" dirty="0"/>
+              <a:rPr lang="es-CO" sz="1800"/>
               <a:t> </a:t>
             </a:r>
             <a:r>
-              <a:rPr lang="es-CO" sz="2200" dirty="0" err="1"/>
+              <a:rPr lang="es-CO" sz="1800" err="1"/>
               <a:t>not</a:t>
             </a:r>
             <a:r>
-              <a:rPr lang="es-CO" sz="2200" dirty="0"/>
+              <a:rPr lang="es-CO" sz="1800"/>
               <a:t> </a:t>
             </a:r>
             <a:r>
-              <a:rPr lang="es-CO" sz="2200" dirty="0" err="1"/>
+              <a:rPr lang="es-CO" sz="1800" err="1"/>
               <a:t>include</a:t>
             </a:r>
             <a:r>
-              <a:rPr lang="es-CO" sz="2200" dirty="0"/>
+              <a:rPr lang="es-CO" sz="1800"/>
               <a:t> </a:t>
             </a:r>
             <a:r>
-              <a:rPr lang="es-CO" sz="2200" dirty="0" err="1"/>
+              <a:rPr lang="es-CO" sz="1800" err="1"/>
               <a:t>demographic</a:t>
             </a:r>
             <a:r>
-              <a:rPr lang="es-CO" sz="2200" dirty="0"/>
+              <a:rPr lang="es-CO" sz="1800"/>
               <a:t> </a:t>
             </a:r>
             <a:r>
-              <a:rPr lang="es-CO" sz="2200" dirty="0" err="1"/>
+              <a:rPr lang="es-CO" sz="1800" err="1"/>
               <a:t>information</a:t>
             </a:r>
             <a:r>
-              <a:rPr lang="es-CO" sz="2200" dirty="0"/>
+              <a:rPr lang="es-CO" sz="1800"/>
               <a:t> </a:t>
             </a:r>
             <a:r>
-              <a:rPr lang="es-CO" sz="2200" dirty="0" err="1"/>
+              <a:rPr lang="es-CO" sz="1800" err="1"/>
               <a:t>such</a:t>
             </a:r>
             <a:r>
-              <a:rPr lang="es-CO" sz="2200" dirty="0"/>
+              <a:rPr lang="es-CO" sz="1800"/>
               <a:t> as </a:t>
             </a:r>
             <a:r>
-              <a:rPr lang="es-CO" sz="2200" dirty="0" err="1"/>
+              <a:rPr lang="es-CO" sz="1800" err="1"/>
               <a:t>gender</a:t>
             </a:r>
             <a:r>
-              <a:rPr lang="es-CO" sz="2200" dirty="0"/>
+              <a:rPr lang="es-CO" sz="1800"/>
               <a:t>, so </a:t>
             </a:r>
             <a:r>
-              <a:rPr lang="es-CO" sz="2200" dirty="0" err="1"/>
+              <a:rPr lang="es-CO" sz="1800" err="1"/>
               <a:t>the</a:t>
             </a:r>
             <a:r>
-              <a:rPr lang="es-CO" sz="2200" dirty="0"/>
+              <a:rPr lang="es-CO" sz="1800"/>
               <a:t> </a:t>
             </a:r>
             <a:r>
-              <a:rPr lang="es-CO" sz="2200" dirty="0" err="1"/>
+              <a:rPr lang="es-CO" sz="1800" err="1"/>
               <a:t>user</a:t>
             </a:r>
             <a:r>
-              <a:rPr lang="es-CO" sz="2200" dirty="0"/>
+              <a:rPr lang="es-CO" sz="1800"/>
               <a:t> are </a:t>
             </a:r>
             <a:r>
-              <a:rPr lang="es-CO" sz="2200" dirty="0" err="1"/>
+              <a:rPr lang="es-CO" sz="1800" err="1"/>
               <a:t>not</a:t>
             </a:r>
             <a:r>
-              <a:rPr lang="es-CO" sz="2200" dirty="0"/>
+              <a:rPr lang="es-CO" sz="1800"/>
               <a:t> </a:t>
             </a:r>
             <a:r>
-              <a:rPr lang="es-CO" sz="2200" dirty="0" err="1"/>
+              <a:rPr lang="es-CO" sz="1800" err="1"/>
               <a:t>necessarily</a:t>
             </a:r>
             <a:r>
-              <a:rPr lang="es-CO" sz="2200" dirty="0"/>
+              <a:rPr lang="es-CO" sz="1800"/>
               <a:t> </a:t>
             </a:r>
             <a:r>
-              <a:rPr lang="es-CO" sz="2200" dirty="0" err="1"/>
+              <a:rPr lang="es-CO" sz="1800" err="1"/>
               <a:t>only</a:t>
             </a:r>
             <a:r>
-              <a:rPr lang="es-CO" sz="2200" dirty="0"/>
+              <a:rPr lang="es-CO" sz="1800"/>
               <a:t> </a:t>
             </a:r>
             <a:r>
-              <a:rPr lang="es-CO" sz="2200" dirty="0" err="1"/>
+              <a:rPr lang="es-CO" sz="1800" err="1"/>
               <a:t>women</a:t>
             </a:r>
-            <a:endParaRPr lang="es-CO" sz="2200" dirty="0"/>
+            <a:endParaRPr lang="es-CO" sz="1800"/>
           </a:p>
           <a:p>
             <a:pPr marL="0" indent="0">
               <a:buNone/>
             </a:pPr>
             <a:r>
-              <a:rPr lang="es-CO" sz="2200" dirty="0"/>
+              <a:rPr lang="es-CO" sz="1800"/>
               <a:t>-</a:t>
             </a:r>
             <a:r>
-              <a:rPr lang="es-CO" sz="2200" dirty="0" err="1"/>
+              <a:rPr lang="es-CO" sz="1800" err="1"/>
               <a:t>Some</a:t>
             </a:r>
             <a:r>
-              <a:rPr lang="es-CO" sz="2200" dirty="0"/>
+              <a:rPr lang="es-CO" sz="1800"/>
               <a:t> variables </a:t>
             </a:r>
             <a:r>
-              <a:rPr lang="es-CO" sz="2200" dirty="0" err="1"/>
+              <a:rPr lang="es-CO" sz="1800" err="1"/>
               <a:t>may</a:t>
             </a:r>
             <a:r>
-              <a:rPr lang="es-CO" sz="2200" dirty="0"/>
+              <a:rPr lang="es-CO" sz="1800"/>
               <a:t> </a:t>
             </a:r>
             <a:r>
-              <a:rPr lang="es-CO" sz="2200" dirty="0" err="1"/>
+              <a:rPr lang="es-CO" sz="1800" err="1"/>
               <a:t>require</a:t>
             </a:r>
             <a:r>
-              <a:rPr lang="es-CO" sz="2200" dirty="0"/>
+              <a:rPr lang="es-CO" sz="1800"/>
               <a:t> </a:t>
             </a:r>
             <a:r>
-              <a:rPr lang="es-CO" sz="2200" dirty="0" err="1"/>
+              <a:rPr lang="es-CO" sz="1800" err="1"/>
               <a:t>formatting</a:t>
             </a:r>
             <a:r>
-              <a:rPr lang="es-CO" sz="2200" dirty="0"/>
+              <a:rPr lang="es-CO" sz="1800"/>
               <a:t> and </a:t>
             </a:r>
             <a:r>
-              <a:rPr lang="es-CO" sz="2200" dirty="0" err="1"/>
+              <a:rPr lang="es-CO" sz="1800" err="1"/>
               <a:t>cleaning</a:t>
             </a:r>
             <a:r>
-              <a:rPr lang="es-CO" sz="2200" dirty="0"/>
+              <a:rPr lang="es-CO" sz="1800"/>
               <a:t> </a:t>
             </a:r>
             <a:r>
-              <a:rPr lang="es-CO" sz="2200" dirty="0" err="1"/>
+              <a:rPr lang="es-CO" sz="1800" err="1"/>
               <a:t>before</a:t>
             </a:r>
             <a:r>
-              <a:rPr lang="es-CO" sz="2200" dirty="0"/>
+              <a:rPr lang="es-CO" sz="1800"/>
               <a:t> </a:t>
             </a:r>
             <a:r>
-              <a:rPr lang="es-CO" sz="2200" dirty="0" err="1"/>
+              <a:rPr lang="es-CO" sz="1800" err="1"/>
               <a:t>the</a:t>
             </a:r>
             <a:r>
-              <a:rPr lang="es-CO" sz="2200" dirty="0"/>
+              <a:rPr lang="es-CO" sz="1800"/>
               <a:t> análisis</a:t>
             </a:r>
           </a:p>
@@ -8232,59 +8359,137 @@
               <a:buNone/>
             </a:pPr>
             <a:r>
-              <a:rPr lang="es-CO" sz="2200" dirty="0" err="1"/>
+              <a:rPr lang="es-CO" sz="1800"/>
+              <a:t>-</a:t>
+            </a:r>
+            <a:r>
+              <a:rPr lang="es-CO" sz="1800" err="1"/>
+              <a:t>FitBit</a:t>
+            </a:r>
+            <a:r>
+              <a:rPr lang="es-CO" sz="1800"/>
+              <a:t> data </a:t>
+            </a:r>
+            <a:r>
+              <a:rPr lang="es-CO" sz="1800" err="1"/>
+              <a:t>used</a:t>
+            </a:r>
+            <a:r>
+              <a:rPr lang="es-CO" sz="1800"/>
+              <a:t> as a proxy and </a:t>
+            </a:r>
+            <a:r>
+              <a:rPr lang="es-CO" sz="1800" err="1"/>
+              <a:t>may</a:t>
+            </a:r>
+            <a:r>
+              <a:rPr lang="es-CO" sz="1800"/>
+              <a:t> </a:t>
+            </a:r>
+            <a:r>
+              <a:rPr lang="es-CO" sz="1800" err="1"/>
+              <a:t>not</a:t>
+            </a:r>
+            <a:r>
+              <a:rPr lang="es-CO" sz="1800"/>
+              <a:t> </a:t>
+            </a:r>
+            <a:r>
+              <a:rPr lang="es-CO" sz="1800" err="1"/>
+              <a:t>fully</a:t>
+            </a:r>
+            <a:r>
+              <a:rPr lang="es-CO" sz="1800"/>
+              <a:t> </a:t>
+            </a:r>
+            <a:r>
+              <a:rPr lang="es-CO" sz="1800" err="1"/>
+              <a:t>represent</a:t>
+            </a:r>
+            <a:r>
+              <a:rPr lang="es-CO" sz="1800"/>
+              <a:t> </a:t>
+            </a:r>
+            <a:r>
+              <a:rPr lang="es-CO" sz="1800" err="1"/>
+              <a:t>Bellabeat</a:t>
+            </a:r>
+            <a:r>
+              <a:rPr lang="es-CO" sz="1800"/>
+              <a:t> </a:t>
+            </a:r>
+            <a:r>
+              <a:rPr lang="es-CO" sz="1800" err="1"/>
+              <a:t>user´s</a:t>
+            </a:r>
+            <a:r>
+              <a:rPr lang="es-CO" sz="1800"/>
+              <a:t> </a:t>
+            </a:r>
+            <a:r>
+              <a:rPr lang="es-CO" sz="1800" err="1"/>
+              <a:t>behavior</a:t>
+            </a:r>
+            <a:endParaRPr lang="es-CO" sz="1800"/>
+          </a:p>
+          <a:p>
+            <a:pPr marL="0" indent="0">
+              <a:buNone/>
+            </a:pPr>
+            <a:r>
+              <a:rPr lang="es-CO" sz="1800" err="1"/>
               <a:t>From</a:t>
             </a:r>
             <a:r>
-              <a:rPr lang="es-CO" sz="2200" dirty="0"/>
+              <a:rPr lang="es-CO" sz="1800"/>
               <a:t> </a:t>
             </a:r>
             <a:r>
-              <a:rPr lang="es-CO" sz="2200" dirty="0" err="1"/>
+              <a:rPr lang="es-CO" sz="1800" err="1"/>
               <a:t>the</a:t>
             </a:r>
             <a:r>
-              <a:rPr lang="es-CO" sz="2200" dirty="0"/>
+              <a:rPr lang="es-CO" sz="1800"/>
               <a:t> </a:t>
             </a:r>
             <a:r>
-              <a:rPr lang="es-CO" sz="2200" dirty="0" err="1"/>
+              <a:rPr lang="es-CO" sz="1800" err="1"/>
               <a:t>dataset</a:t>
             </a:r>
             <a:r>
-              <a:rPr lang="es-CO" sz="2200" dirty="0"/>
+              <a:rPr lang="es-CO" sz="1800"/>
               <a:t> </a:t>
             </a:r>
             <a:r>
-              <a:rPr lang="es-CO" sz="2200" dirty="0" err="1"/>
+              <a:rPr lang="es-CO" sz="1800" err="1"/>
               <a:t>were</a:t>
             </a:r>
             <a:r>
-              <a:rPr lang="es-CO" sz="2200" dirty="0"/>
+              <a:rPr lang="es-CO" sz="1800"/>
               <a:t> removed non-</a:t>
             </a:r>
             <a:r>
-              <a:rPr lang="es-CO" sz="2200" dirty="0" err="1"/>
+              <a:rPr lang="es-CO" sz="1800" err="1"/>
               <a:t>wear</a:t>
             </a:r>
             <a:r>
-              <a:rPr lang="es-CO" sz="2200" dirty="0"/>
+              <a:rPr lang="es-CO" sz="1800"/>
               <a:t> </a:t>
             </a:r>
             <a:r>
-              <a:rPr lang="es-CO" sz="2200" dirty="0" err="1"/>
+              <a:rPr lang="es-CO" sz="1800" err="1"/>
               <a:t>days</a:t>
             </a:r>
             <a:r>
-              <a:rPr lang="es-CO" sz="2200" dirty="0"/>
+              <a:rPr lang="es-CO" sz="1800"/>
               <a:t> (72 </a:t>
             </a:r>
             <a:r>
-              <a:rPr lang="es-CO" sz="2200" dirty="0" err="1"/>
+              <a:rPr lang="es-CO" sz="1800" err="1"/>
               <a:t>records</a:t>
             </a:r>
             <a:r>
-              <a:rPr lang="es-CO" sz="2200" dirty="0"/>
+              <a:rPr lang="es-CO" sz="1800"/>
               <a:t>)</a:t>
             </a:r>
           </a:p>
@@ -9848,6 +10053,14 @@
 <file path=ppt/slides/slide7.xml><?xml version="1.0" encoding="utf-8"?>
 <p:sld xmlns:a="http://schemas.openxmlformats.org/drawingml/2006/main" xmlns:r="http://schemas.openxmlformats.org/officeDocument/2006/relationships" xmlns:p="http://schemas.openxmlformats.org/presentationml/2006/main">
   <p:cSld>
+    <p:bg>
+      <p:bgPr>
+        <a:solidFill>
+          <a:schemeClr val="bg1"/>
+        </a:solidFill>
+        <a:effectLst/>
+      </p:bgPr>
+    </p:bg>
     <p:spTree>
       <p:nvGrpSpPr>
         <p:cNvPr id="1" name=""/>
@@ -9862,6 +10075,129 @@
           <a:chExt cx="0" cy="0"/>
         </a:xfrm>
       </p:grpSpPr>
+      <p:sp useBgFill="1">
+        <p:nvSpPr>
+          <p:cNvPr id="8" name="Rectangle 7">
+            <a:extLst>
+              <a:ext uri="{FF2B5EF4-FFF2-40B4-BE49-F238E27FC236}">
+                <a16:creationId xmlns:a16="http://schemas.microsoft.com/office/drawing/2014/main" id="{C2554CA6-288E-4202-BC52-2E5A8F0C0AED}"/>
+              </a:ext>
+              <a:ext uri="{C183D7F6-B498-43B3-948B-1728B52AA6E4}">
+                <adec:decorative xmlns:adec="http://schemas.microsoft.com/office/drawing/2017/decorative" val="1"/>
+              </a:ext>
+            </a:extLst>
+          </p:cNvPr>
+          <p:cNvSpPr>
+            <a:spLocks noGrp="1" noRot="1" noChangeAspect="1" noMove="1" noResize="1" noEditPoints="1" noAdjustHandles="1" noChangeArrowheads="1" noChangeShapeType="1" noTextEdit="1"/>
+          </p:cNvSpPr>
+          <p:nvPr>
+            <p:extLst>
+              <p:ext uri="{386F3935-93C4-4BCD-93E2-E3B085C9AB24}">
+                <p16:designElem xmlns:p16="http://schemas.microsoft.com/office/powerpoint/2015/main" val="1"/>
+              </p:ext>
+            </p:extLst>
+          </p:nvPr>
+        </p:nvSpPr>
+        <p:spPr>
+          <a:xfrm>
+            <a:off x="3048" y="0"/>
+            <a:ext cx="12188952" cy="6858000"/>
+          </a:xfrm>
+          <a:prstGeom prst="rect">
+            <a:avLst/>
+          </a:prstGeom>
+          <a:ln>
+            <a:noFill/>
+          </a:ln>
+        </p:spPr>
+        <p:style>
+          <a:lnRef idx="2">
+            <a:schemeClr val="accent1">
+              <a:shade val="50000"/>
+            </a:schemeClr>
+          </a:lnRef>
+          <a:fillRef idx="1">
+            <a:schemeClr val="accent1"/>
+          </a:fillRef>
+          <a:effectRef idx="0">
+            <a:schemeClr val="accent1"/>
+          </a:effectRef>
+          <a:fontRef idx="minor">
+            <a:schemeClr val="lt1"/>
+          </a:fontRef>
+        </p:style>
+        <p:txBody>
+          <a:bodyPr rtlCol="0" anchor="ctr"/>
+          <a:lstStyle/>
+          <a:p>
+            <a:pPr algn="ctr"/>
+            <a:endParaRPr lang="en-US"/>
+          </a:p>
+        </p:txBody>
+      </p:sp>
+      <p:sp>
+        <p:nvSpPr>
+          <p:cNvPr id="10" name="Oval 9">
+            <a:extLst>
+              <a:ext uri="{FF2B5EF4-FFF2-40B4-BE49-F238E27FC236}">
+                <a16:creationId xmlns:a16="http://schemas.microsoft.com/office/drawing/2014/main" id="{B10BB131-AC8E-4A8E-A5D1-36260F720C3B}"/>
+              </a:ext>
+              <a:ext uri="{C183D7F6-B498-43B3-948B-1728B52AA6E4}">
+                <adec:decorative xmlns:adec="http://schemas.microsoft.com/office/drawing/2017/decorative" val="1"/>
+              </a:ext>
+            </a:extLst>
+          </p:cNvPr>
+          <p:cNvSpPr>
+            <a:spLocks noGrp="1" noRot="1" noChangeAspect="1" noMove="1" noResize="1" noEditPoints="1" noAdjustHandles="1" noChangeArrowheads="1" noChangeShapeType="1" noTextEdit="1"/>
+          </p:cNvSpPr>
+          <p:nvPr>
+            <p:extLst>
+              <p:ext uri="{386F3935-93C4-4BCD-93E2-E3B085C9AB24}">
+                <p16:designElem xmlns:p16="http://schemas.microsoft.com/office/powerpoint/2015/main" val="1"/>
+              </p:ext>
+            </p:extLst>
+          </p:nvPr>
+        </p:nvSpPr>
+        <p:spPr>
+          <a:xfrm>
+            <a:off x="489189" y="1119031"/>
+            <a:ext cx="4619938" cy="4619938"/>
+          </a:xfrm>
+          <a:prstGeom prst="ellipse">
+            <a:avLst/>
+          </a:prstGeom>
+          <a:solidFill>
+            <a:schemeClr val="accent2"/>
+          </a:solidFill>
+          <a:ln>
+            <a:noFill/>
+          </a:ln>
+        </p:spPr>
+        <p:style>
+          <a:lnRef idx="2">
+            <a:schemeClr val="accent1">
+              <a:shade val="50000"/>
+            </a:schemeClr>
+          </a:lnRef>
+          <a:fillRef idx="1">
+            <a:schemeClr val="accent1"/>
+          </a:fillRef>
+          <a:effectRef idx="0">
+            <a:schemeClr val="accent1"/>
+          </a:effectRef>
+          <a:fontRef idx="minor">
+            <a:schemeClr val="lt1"/>
+          </a:fontRef>
+        </p:style>
+        <p:txBody>
+          <a:bodyPr rtlCol="0" anchor="ctr"/>
+          <a:lstStyle/>
+          <a:p>
+            <a:pPr algn="ctr"/>
+            <a:endParaRPr lang="en-US"/>
+          </a:p>
+        </p:txBody>
+      </p:sp>
       <p:sp>
         <p:nvSpPr>
           <p:cNvPr id="2" name="Título 1">
@@ -9878,12 +10214,212 @@
             <p:ph type="title"/>
           </p:nvPr>
         </p:nvSpPr>
-        <p:spPr/>
+        <p:spPr>
+          <a:xfrm>
+            <a:off x="1171074" y="1396686"/>
+            <a:ext cx="3240506" cy="4064628"/>
+          </a:xfrm>
+        </p:spPr>
         <p:txBody>
-          <a:bodyPr/>
+          <a:bodyPr>
+            <a:normAutofit/>
+          </a:bodyPr>
           <a:lstStyle/>
           <a:p>
-            <a:endParaRPr lang="es-CO"/>
+            <a:r>
+              <a:rPr lang="es-CO">
+                <a:solidFill>
+                  <a:srgbClr val="FFFFFF"/>
+                </a:solidFill>
+              </a:rPr>
+              <a:t>Next steps</a:t>
+            </a:r>
+          </a:p>
+        </p:txBody>
+      </p:sp>
+      <p:sp>
+        <p:nvSpPr>
+          <p:cNvPr id="12" name="Arc 11">
+            <a:extLst>
+              <a:ext uri="{FF2B5EF4-FFF2-40B4-BE49-F238E27FC236}">
+                <a16:creationId xmlns:a16="http://schemas.microsoft.com/office/drawing/2014/main" id="{5B7778FC-632E-4DCA-A7CB-0D7731CCF970}"/>
+              </a:ext>
+              <a:ext uri="{C183D7F6-B498-43B3-948B-1728B52AA6E4}">
+                <adec:decorative xmlns:adec="http://schemas.microsoft.com/office/drawing/2017/decorative" val="1"/>
+              </a:ext>
+            </a:extLst>
+          </p:cNvPr>
+          <p:cNvSpPr>
+            <a:spLocks noGrp="1" noRot="1" noChangeAspect="1" noMove="1" noResize="1" noEditPoints="1" noAdjustHandles="1" noChangeArrowheads="1" noChangeShapeType="1" noTextEdit="1"/>
+          </p:cNvSpPr>
+          <p:nvPr>
+            <p:extLst>
+              <p:ext uri="{386F3935-93C4-4BCD-93E2-E3B085C9AB24}">
+                <p16:designElem xmlns:p16="http://schemas.microsoft.com/office/powerpoint/2015/main" val="1"/>
+              </p:ext>
+            </p:extLst>
+          </p:nvPr>
+        </p:nvSpPr>
+        <p:spPr>
+          <a:xfrm rot="19809111">
+            <a:off x="8683720" y="941148"/>
+            <a:ext cx="2987899" cy="2987899"/>
+          </a:xfrm>
+          <a:prstGeom prst="arc">
+            <a:avLst>
+              <a:gd name="adj1" fmla="val 15817365"/>
+              <a:gd name="adj2" fmla="val 1781380"/>
+            </a:avLst>
+          </a:prstGeom>
+          <a:ln w="127000" cap="rnd">
+            <a:solidFill>
+              <a:schemeClr val="accent4"/>
+            </a:solidFill>
+            <a:prstDash val="dash"/>
+            <a:miter lim="800000"/>
+          </a:ln>
+        </p:spPr>
+        <p:style>
+          <a:lnRef idx="1">
+            <a:schemeClr val="accent1"/>
+          </a:lnRef>
+          <a:fillRef idx="0">
+            <a:schemeClr val="accent1"/>
+          </a:fillRef>
+          <a:effectRef idx="0">
+            <a:schemeClr val="accent1"/>
+          </a:effectRef>
+          <a:fontRef idx="minor">
+            <a:schemeClr val="tx1"/>
+          </a:fontRef>
+        </p:style>
+        <p:txBody>
+          <a:bodyPr rtlCol="0" anchor="ctr"/>
+          <a:lstStyle/>
+          <a:p>
+            <a:pPr marL="0" marR="0" lvl="0" indent="0" algn="ctr" defTabSz="914400" rtl="0" eaLnBrk="1" fontAlgn="auto" latinLnBrk="0" hangingPunct="1">
+              <a:lnSpc>
+                <a:spcPct val="100000"/>
+              </a:lnSpc>
+              <a:spcBef>
+                <a:spcPts val="0"/>
+              </a:spcBef>
+              <a:spcAft>
+                <a:spcPts val="0"/>
+              </a:spcAft>
+              <a:buClrTx/>
+              <a:buSzTx/>
+              <a:buFontTx/>
+              <a:buNone/>
+              <a:tabLst/>
+              <a:defRPr/>
+            </a:pPr>
+            <a:endParaRPr kumimoji="0" lang="en-US" sz="1800" b="0" i="0" u="none" strike="noStrike" kern="1200" cap="none" spc="0" normalizeH="0" baseline="0" noProof="0">
+              <a:ln>
+                <a:noFill/>
+              </a:ln>
+              <a:solidFill>
+                <a:srgbClr val="000000"/>
+              </a:solidFill>
+              <a:effectLst/>
+              <a:uLnTx/>
+              <a:uFillTx/>
+              <a:latin typeface="Calibri" panose="020F0502020204030204"/>
+              <a:ea typeface="+mn-ea"/>
+              <a:cs typeface="+mn-cs"/>
+            </a:endParaRPr>
+          </a:p>
+        </p:txBody>
+      </p:sp>
+      <p:sp>
+        <p:nvSpPr>
+          <p:cNvPr id="14" name="Oval 13">
+            <a:extLst>
+              <a:ext uri="{FF2B5EF4-FFF2-40B4-BE49-F238E27FC236}">
+                <a16:creationId xmlns:a16="http://schemas.microsoft.com/office/drawing/2014/main" id="{FA23A907-97FB-4A8F-880A-DD77401C4296}"/>
+              </a:ext>
+              <a:ext uri="{C183D7F6-B498-43B3-948B-1728B52AA6E4}">
+                <adec:decorative xmlns:adec="http://schemas.microsoft.com/office/drawing/2017/decorative" val="1"/>
+              </a:ext>
+            </a:extLst>
+          </p:cNvPr>
+          <p:cNvSpPr>
+            <a:spLocks noGrp="1" noRot="1" noChangeAspect="1" noMove="1" noResize="1" noEditPoints="1" noAdjustHandles="1" noChangeArrowheads="1" noChangeShapeType="1" noTextEdit="1"/>
+          </p:cNvSpPr>
+          <p:nvPr>
+            <p:extLst>
+              <p:ext uri="{386F3935-93C4-4BCD-93E2-E3B085C9AB24}">
+                <p16:designElem xmlns:p16="http://schemas.microsoft.com/office/powerpoint/2015/main" val="1"/>
+              </p:ext>
+            </p:extLst>
+          </p:nvPr>
+        </p:nvSpPr>
+        <p:spPr>
+          <a:xfrm>
+            <a:off x="910048" y="4780992"/>
+            <a:ext cx="546100" cy="546100"/>
+          </a:xfrm>
+          <a:prstGeom prst="ellipse">
+            <a:avLst/>
+          </a:prstGeom>
+          <a:solidFill>
+            <a:schemeClr val="accent5"/>
+          </a:solidFill>
+          <a:ln>
+            <a:noFill/>
+          </a:ln>
+        </p:spPr>
+        <p:style>
+          <a:lnRef idx="2">
+            <a:schemeClr val="accent1">
+              <a:shade val="50000"/>
+            </a:schemeClr>
+          </a:lnRef>
+          <a:fillRef idx="1">
+            <a:schemeClr val="accent1"/>
+          </a:fillRef>
+          <a:effectRef idx="0">
+            <a:schemeClr val="accent1"/>
+          </a:effectRef>
+          <a:fontRef idx="minor">
+            <a:schemeClr val="lt1"/>
+          </a:fontRef>
+        </p:style>
+        <p:txBody>
+          <a:bodyPr rtlCol="0" anchor="ctr"/>
+          <a:lstStyle/>
+          <a:p>
+            <a:pPr marL="0" marR="0" lvl="0" indent="0" algn="ctr" defTabSz="914400" rtl="0" eaLnBrk="1" fontAlgn="auto" latinLnBrk="0" hangingPunct="1">
+              <a:lnSpc>
+                <a:spcPct val="100000"/>
+              </a:lnSpc>
+              <a:spcBef>
+                <a:spcPts val="0"/>
+              </a:spcBef>
+              <a:spcAft>
+                <a:spcPts val="0"/>
+              </a:spcAft>
+              <a:buClrTx/>
+              <a:buSzTx/>
+              <a:buFontTx/>
+              <a:buNone/>
+              <a:tabLst/>
+              <a:defRPr/>
+            </a:pPr>
+            <a:endParaRPr kumimoji="0" lang="en-US" sz="1800" b="0" i="0" u="none" strike="noStrike" kern="1200" cap="none" spc="0" normalizeH="0" baseline="0" noProof="0">
+              <a:ln>
+                <a:noFill/>
+              </a:ln>
+              <a:solidFill>
+                <a:srgbClr val="FFFFFF"/>
+              </a:solidFill>
+              <a:effectLst/>
+              <a:uLnTx/>
+              <a:uFillTx/>
+              <a:latin typeface="Calibri" panose="020F0502020204030204"/>
+              <a:ea typeface="+mn-ea"/>
+              <a:cs typeface="+mn-cs"/>
+            </a:endParaRPr>
           </a:p>
         </p:txBody>
       </p:sp>
@@ -9903,12 +10439,226 @@
             <p:ph idx="1"/>
           </p:nvPr>
         </p:nvSpPr>
-        <p:spPr/>
+        <p:spPr>
+          <a:xfrm>
+            <a:off x="5370153" y="1526033"/>
+            <a:ext cx="5536397" cy="3935281"/>
+          </a:xfrm>
+        </p:spPr>
         <p:txBody>
-          <a:bodyPr/>
+          <a:bodyPr>
+            <a:normAutofit/>
+          </a:bodyPr>
           <a:lstStyle/>
           <a:p>
-            <a:endParaRPr lang="es-CO"/>
+            <a:pPr marL="0" indent="0">
+              <a:buNone/>
+            </a:pPr>
+            <a:r>
+              <a:rPr lang="es-CO" sz="2600" dirty="0"/>
+              <a:t>-</a:t>
+            </a:r>
+            <a:r>
+              <a:rPr lang="es-CO" sz="2600" dirty="0" err="1"/>
+              <a:t>Validate</a:t>
+            </a:r>
+            <a:r>
+              <a:rPr lang="es-CO" sz="2600" dirty="0"/>
+              <a:t> </a:t>
+            </a:r>
+            <a:r>
+              <a:rPr lang="es-CO" sz="2600" dirty="0" err="1"/>
+              <a:t>findings</a:t>
+            </a:r>
+            <a:r>
+              <a:rPr lang="es-CO" sz="2600" dirty="0"/>
+              <a:t> </a:t>
+            </a:r>
+            <a:r>
+              <a:rPr lang="es-CO" sz="2600" dirty="0" err="1"/>
+              <a:t>using</a:t>
+            </a:r>
+            <a:r>
+              <a:rPr lang="es-CO" sz="2600" dirty="0"/>
+              <a:t> real </a:t>
+            </a:r>
+            <a:r>
+              <a:rPr lang="es-CO" sz="2600" dirty="0" err="1"/>
+              <a:t>bellabeat</a:t>
+            </a:r>
+            <a:r>
+              <a:rPr lang="es-CO" sz="2600" dirty="0"/>
+              <a:t> data, </a:t>
+            </a:r>
+            <a:r>
+              <a:rPr lang="es-CO" sz="2600" dirty="0" err="1"/>
+              <a:t>specially</a:t>
+            </a:r>
+            <a:r>
+              <a:rPr lang="es-CO" sz="2600" dirty="0"/>
+              <a:t> </a:t>
+            </a:r>
+            <a:r>
+              <a:rPr lang="es-CO" sz="2600" dirty="0" err="1"/>
+              <a:t>hydration</a:t>
+            </a:r>
+            <a:r>
+              <a:rPr lang="es-CO" sz="2600" dirty="0"/>
+              <a:t> </a:t>
+            </a:r>
+            <a:r>
+              <a:rPr lang="es-CO" sz="2600" dirty="0" err="1"/>
+              <a:t>frequency</a:t>
+            </a:r>
+            <a:r>
+              <a:rPr lang="es-CO" sz="2600" dirty="0"/>
+              <a:t> and </a:t>
+            </a:r>
+            <a:r>
+              <a:rPr lang="es-CO" sz="2600" dirty="0" err="1"/>
+              <a:t>reminder</a:t>
+            </a:r>
+            <a:r>
+              <a:rPr lang="es-CO" sz="2600" dirty="0"/>
+              <a:t> </a:t>
+            </a:r>
+            <a:r>
+              <a:rPr lang="es-CO" sz="2600" dirty="0" err="1"/>
+              <a:t>adherence</a:t>
+            </a:r>
+            <a:endParaRPr lang="es-CO" sz="2600" dirty="0"/>
+          </a:p>
+          <a:p>
+            <a:pPr marL="0" indent="0">
+              <a:buNone/>
+            </a:pPr>
+            <a:r>
+              <a:rPr lang="es-CO" sz="2600" dirty="0"/>
+              <a:t>-</a:t>
+            </a:r>
+            <a:r>
+              <a:rPr lang="es-CO" sz="2600" dirty="0" err="1"/>
+              <a:t>Track</a:t>
+            </a:r>
+            <a:r>
+              <a:rPr lang="es-CO" sz="2600" dirty="0"/>
+              <a:t> </a:t>
+            </a:r>
+            <a:r>
+              <a:rPr lang="es-CO" sz="2600" dirty="0" err="1"/>
+              <a:t>key</a:t>
+            </a:r>
+            <a:r>
+              <a:rPr lang="es-CO" sz="2600" dirty="0"/>
+              <a:t> </a:t>
+            </a:r>
+            <a:r>
+              <a:rPr lang="es-CO" sz="2600" dirty="0" err="1"/>
+              <a:t>KPIs</a:t>
+            </a:r>
+            <a:r>
+              <a:rPr lang="es-CO" sz="2600" dirty="0"/>
+              <a:t> </a:t>
+            </a:r>
+            <a:r>
+              <a:rPr lang="es-CO" sz="2600" dirty="0" err="1"/>
+              <a:t>such</a:t>
+            </a:r>
+            <a:r>
+              <a:rPr lang="es-CO" sz="2600" dirty="0"/>
+              <a:t> as </a:t>
+            </a:r>
+            <a:r>
+              <a:rPr lang="es-CO" sz="2600" dirty="0" err="1"/>
+              <a:t>sedentary</a:t>
+            </a:r>
+            <a:r>
+              <a:rPr lang="es-CO" sz="2600" dirty="0"/>
+              <a:t> minutes </a:t>
+            </a:r>
+            <a:r>
+              <a:rPr lang="es-CO" sz="2600" dirty="0" err="1"/>
+              <a:t>reduction</a:t>
+            </a:r>
+            <a:r>
+              <a:rPr lang="es-CO" sz="2600" dirty="0"/>
+              <a:t>, </a:t>
+            </a:r>
+            <a:r>
+              <a:rPr lang="es-CO" sz="2600" dirty="0" err="1"/>
+              <a:t>increase</a:t>
+            </a:r>
+            <a:r>
+              <a:rPr lang="es-CO" sz="2600" dirty="0"/>
+              <a:t> in active minutes and premium </a:t>
+            </a:r>
+            <a:r>
+              <a:rPr lang="es-CO" sz="2600" dirty="0" err="1"/>
+              <a:t>membership</a:t>
+            </a:r>
+            <a:r>
+              <a:rPr lang="es-CO" sz="2600" dirty="0"/>
+              <a:t> </a:t>
+            </a:r>
+            <a:r>
+              <a:rPr lang="es-CO" sz="2600" dirty="0" err="1"/>
+              <a:t>conversion</a:t>
+            </a:r>
+            <a:endParaRPr lang="es-CO" sz="2600" dirty="0"/>
+          </a:p>
+          <a:p>
+            <a:pPr marL="0" indent="0">
+              <a:buNone/>
+            </a:pPr>
+            <a:r>
+              <a:rPr lang="es-CO" sz="2600" dirty="0"/>
+              <a:t>-</a:t>
+            </a:r>
+            <a:r>
+              <a:rPr lang="es-CO" sz="2600" dirty="0" err="1"/>
+              <a:t>Incorporate</a:t>
+            </a:r>
+            <a:r>
+              <a:rPr lang="es-CO" sz="2600" dirty="0"/>
+              <a:t> </a:t>
+            </a:r>
+            <a:r>
+              <a:rPr lang="es-CO" sz="2600" dirty="0" err="1"/>
+              <a:t>demographic</a:t>
+            </a:r>
+            <a:r>
+              <a:rPr lang="es-CO" sz="2600" dirty="0"/>
+              <a:t> data </a:t>
+            </a:r>
+            <a:r>
+              <a:rPr lang="es-CO" sz="2600" dirty="0" err="1"/>
+              <a:t>to</a:t>
+            </a:r>
+            <a:r>
+              <a:rPr lang="es-CO" sz="2600" dirty="0"/>
+              <a:t> </a:t>
+            </a:r>
+            <a:r>
+              <a:rPr lang="es-CO" sz="2600" dirty="0" err="1"/>
+              <a:t>enable</a:t>
+            </a:r>
+            <a:r>
+              <a:rPr lang="es-CO" sz="2600" dirty="0"/>
+              <a:t> more </a:t>
+            </a:r>
+            <a:r>
+              <a:rPr lang="es-CO" sz="2600" dirty="0" err="1"/>
+              <a:t>personalized</a:t>
+            </a:r>
+            <a:r>
+              <a:rPr lang="es-CO" sz="2600" dirty="0"/>
+              <a:t> marketing </a:t>
+            </a:r>
+            <a:r>
+              <a:rPr lang="es-CO" sz="2600" dirty="0" err="1"/>
+              <a:t>strategies</a:t>
+            </a:r>
+            <a:endParaRPr lang="es-CO" sz="2600" dirty="0"/>
           </a:p>
         </p:txBody>
       </p:sp>

</xml_diff>